<commit_message>
self contained and fixes * removed self_contained for revealJS (closes #4) * renamed some resources * New pptx template
</commit_message>
<xml_diff>
--- a/_extensions/inrae/ressources/template.pptx
+++ b/_extensions/inrae/ressources/template.pptx
@@ -5,13 +5,14 @@
     <p:sldMasterId id="2147483648" r:id="rId1"/>
   </p:sldMasterIdLst>
   <p:sldIdLst>
-    <p:sldId id="256" r:id="rId3"/>
-    <p:sldId id="257" r:id="rId4"/>
+    <p:sldId id="256" r:id="rId2"/>
+    <p:sldId id="257" r:id="rId3"/>
+    <p:sldId id="261" r:id="rId4"/>
     <p:sldId id="258" r:id="rId5"/>
     <p:sldId id="259" r:id="rId6"/>
     <p:sldId id="260" r:id="rId7"/>
   </p:sldIdLst>
-  <p:sldSz cx="12189460" cy="6858000"/>
+  <p:sldSz cx="12188825" cy="6858000"/>
   <p:notesSz cx="6858000" cy="9144000"/>
   <p:defaultTextStyle>
     <a:defPPr>
@@ -108,6 +109,22 @@
       </a:defRPr>
     </a:lvl9pPr>
   </p:defaultTextStyle>
+  <p:extLst>
+    <p:ext uri="{EFAFB233-063F-42B5-8137-9DF3F51BA10A}">
+      <p15:sldGuideLst xmlns:p15="http://schemas.microsoft.com/office/powerpoint/2012/main">
+        <p15:guide id="1" orient="horz" pos="2210">
+          <p15:clr>
+            <a:srgbClr val="A4A3A4"/>
+          </p15:clr>
+        </p15:guide>
+        <p15:guide id="2" pos="3839">
+          <p15:clr>
+            <a:srgbClr val="A4A3A4"/>
+          </p15:clr>
+        </p15:guide>
+      </p15:sldGuideLst>
+    </p:ext>
+  </p:extLst>
 </p:presentation>
 </file>
 
@@ -132,7 +149,7 @@
         <p:nvSpPr>
           <p:cNvPr id="2" name="Title 1"/>
           <p:cNvSpPr>
-            <a:spLocks noGrp="true"/>
+            <a:spLocks noGrp="1"/>
           </p:cNvSpPr>
           <p:nvPr>
             <p:ph type="ctrTitle"/>
@@ -159,10 +176,9 @@
           </a:lstStyle>
           <a:p>
             <a:r>
-              <a:rPr lang="en-US" smtClean="0"/>
+              <a:rPr lang="en-US"/>
               <a:t>Click to edit Master title style</a:t>
             </a:r>
-            <a:endParaRPr lang="en-US"/>
           </a:p>
         </p:txBody>
       </p:sp>
@@ -170,7 +186,7 @@
         <p:nvSpPr>
           <p:cNvPr id="3" name="Subtitle 2"/>
           <p:cNvSpPr>
-            <a:spLocks noGrp="true"/>
+            <a:spLocks noGrp="1"/>
           </p:cNvSpPr>
           <p:nvPr>
             <p:ph type="subTitle" idx="1"/>
@@ -278,10 +294,9 @@
           </a:lstStyle>
           <a:p>
             <a:r>
-              <a:rPr lang="en-US" smtClean="0"/>
+              <a:rPr lang="en-US"/>
               <a:t>Click to edit Master subtitle style</a:t>
             </a:r>
-            <a:endParaRPr lang="en-US"/>
           </a:p>
         </p:txBody>
       </p:sp>
@@ -289,7 +304,7 @@
         <p:nvSpPr>
           <p:cNvPr id="4" name="Date Placeholder 3"/>
           <p:cNvSpPr>
-            <a:spLocks noGrp="true"/>
+            <a:spLocks noGrp="1"/>
           </p:cNvSpPr>
           <p:nvPr>
             <p:ph type="dt" sz="half" idx="10"/>
@@ -302,6 +317,7 @@
           <a:p>
             <a:fld id="{241EB5C9-1307-BA42-ABA2-0BC069CD8E7F}" type="datetimeFigureOut">
               <a:rPr lang="en-US" smtClean="0"/>
+              <a:t>4/24/23</a:t>
             </a:fld>
             <a:endParaRPr lang="en-US"/>
           </a:p>
@@ -311,7 +327,7 @@
         <p:nvSpPr>
           <p:cNvPr id="5" name="Footer Placeholder 4"/>
           <p:cNvSpPr>
-            <a:spLocks noGrp="true"/>
+            <a:spLocks noGrp="1"/>
           </p:cNvSpPr>
           <p:nvPr>
             <p:ph type="ftr" sz="quarter" idx="11"/>
@@ -330,7 +346,7 @@
         <p:nvSpPr>
           <p:cNvPr id="6" name="Slide Number Placeholder 5"/>
           <p:cNvSpPr>
-            <a:spLocks noGrp="true"/>
+            <a:spLocks noGrp="1"/>
           </p:cNvSpPr>
           <p:nvPr>
             <p:ph type="sldNum" sz="quarter" idx="12"/>
@@ -343,6 +359,7 @@
           <a:p>
             <a:fld id="{C5EF2332-01BF-834F-8236-50238282D533}" type="slidenum">
               <a:rPr lang="en-US" smtClean="0"/>
+              <a:t>‹N°›</a:t>
             </a:fld>
             <a:endParaRPr lang="en-US"/>
           </a:p>
@@ -352,15 +369,15 @@
         <p:nvPicPr>
           <p:cNvPr id="7" name="Image 4"/>
           <p:cNvPicPr>
-            <a:picLocks noChangeAspect="true"/>
+            <a:picLocks noChangeAspect="1"/>
           </p:cNvPicPr>
-          <p:nvPr userDrawn="true"/>
+          <p:nvPr userDrawn="1"/>
         </p:nvPicPr>
         <p:blipFill>
           <a:blip r:embed="rId2">
             <a:extLst>
               <a:ext uri="{28A0092B-C50C-407E-A947-70E740481C1C}">
-                <a14:useLocalDpi xmlns:a14="http://schemas.microsoft.com/office/drawing/2010/main" val="false"/>
+                <a14:useLocalDpi xmlns:a14="http://schemas.microsoft.com/office/drawing/2010/main" val="0"/>
               </a:ext>
             </a:extLst>
           </a:blip>
@@ -382,15 +399,15 @@
         <p:nvPicPr>
           <p:cNvPr id="8" name="Image 5"/>
           <p:cNvPicPr>
-            <a:picLocks noChangeAspect="true"/>
+            <a:picLocks noChangeAspect="1"/>
           </p:cNvPicPr>
-          <p:nvPr userDrawn="true"/>
+          <p:nvPr userDrawn="1"/>
         </p:nvPicPr>
         <p:blipFill>
           <a:blip r:embed="rId3">
             <a:extLst>
               <a:ext uri="{28A0092B-C50C-407E-A947-70E740481C1C}">
-                <a14:useLocalDpi xmlns:a14="http://schemas.microsoft.com/office/drawing/2010/main" val="false"/>
+                <a14:useLocalDpi xmlns:a14="http://schemas.microsoft.com/office/drawing/2010/main" val="0"/>
               </a:ext>
             </a:extLst>
           </a:blip>
@@ -412,15 +429,15 @@
         <p:nvPicPr>
           <p:cNvPr id="9" name="Image 2" descr="Une image contenant dessin, signe&#10;&#10;Description générée automatiquement"/>
           <p:cNvPicPr>
-            <a:picLocks noChangeAspect="true"/>
+            <a:picLocks noChangeAspect="1"/>
           </p:cNvPicPr>
-          <p:nvPr userDrawn="true"/>
+          <p:nvPr userDrawn="1"/>
         </p:nvPicPr>
         <p:blipFill>
           <a:blip r:embed="rId4">
             <a:extLst>
               <a:ext uri="{28A0092B-C50C-407E-A947-70E740481C1C}">
-                <a14:useLocalDpi xmlns:a14="http://schemas.microsoft.com/office/drawing/2010/main" val="false"/>
+                <a14:useLocalDpi xmlns:a14="http://schemas.microsoft.com/office/drawing/2010/main" val="0"/>
               </a:ext>
             </a:extLst>
           </a:blip>
@@ -467,7 +484,7 @@
         <p:nvSpPr>
           <p:cNvPr id="2" name="Title 1"/>
           <p:cNvSpPr>
-            <a:spLocks noGrp="true"/>
+            <a:spLocks noGrp="1"/>
           </p:cNvSpPr>
           <p:nvPr>
             <p:ph type="title"/>
@@ -479,10 +496,9 @@
           <a:lstStyle/>
           <a:p>
             <a:r>
-              <a:rPr lang="en-US" smtClean="0"/>
+              <a:rPr lang="en-US"/>
               <a:t>Click to edit Master title style</a:t>
             </a:r>
-            <a:endParaRPr lang="en-US"/>
           </a:p>
         </p:txBody>
       </p:sp>
@@ -490,7 +506,7 @@
         <p:nvSpPr>
           <p:cNvPr id="3" name="Vertical Text Placeholder 2"/>
           <p:cNvSpPr>
-            <a:spLocks noGrp="true"/>
+            <a:spLocks noGrp="1"/>
           </p:cNvSpPr>
           <p:nvPr>
             <p:ph type="body" orient="vert" idx="1"/>
@@ -503,42 +519,37 @@
           <a:p>
             <a:pPr lvl="0"/>
             <a:r>
-              <a:rPr lang="en-US" smtClean="0"/>
+              <a:rPr lang="en-US"/>
               <a:t>Click to edit Master text styles</a:t>
             </a:r>
-            <a:endParaRPr lang="en-US" smtClean="0"/>
           </a:p>
           <a:p>
             <a:pPr lvl="1"/>
             <a:r>
-              <a:rPr lang="en-US" smtClean="0"/>
+              <a:rPr lang="en-US"/>
               <a:t>Second level</a:t>
             </a:r>
-            <a:endParaRPr lang="en-US" smtClean="0"/>
           </a:p>
           <a:p>
             <a:pPr lvl="2"/>
             <a:r>
-              <a:rPr lang="en-US" smtClean="0"/>
+              <a:rPr lang="en-US"/>
               <a:t>Third level</a:t>
             </a:r>
-            <a:endParaRPr lang="en-US" smtClean="0"/>
           </a:p>
           <a:p>
             <a:pPr lvl="3"/>
             <a:r>
-              <a:rPr lang="en-US" smtClean="0"/>
+              <a:rPr lang="en-US"/>
               <a:t>Fourth level</a:t>
             </a:r>
-            <a:endParaRPr lang="en-US" smtClean="0"/>
           </a:p>
           <a:p>
             <a:pPr lvl="4"/>
             <a:r>
-              <a:rPr lang="en-US" smtClean="0"/>
+              <a:rPr lang="en-US"/>
               <a:t>Fifth level</a:t>
             </a:r>
-            <a:endParaRPr lang="en-US"/>
           </a:p>
         </p:txBody>
       </p:sp>
@@ -546,7 +557,7 @@
         <p:nvSpPr>
           <p:cNvPr id="4" name="Date Placeholder 3"/>
           <p:cNvSpPr>
-            <a:spLocks noGrp="true"/>
+            <a:spLocks noGrp="1"/>
           </p:cNvSpPr>
           <p:nvPr>
             <p:ph type="dt" sz="half" idx="10"/>
@@ -559,6 +570,7 @@
           <a:p>
             <a:fld id="{241EB5C9-1307-BA42-ABA2-0BC069CD8E7F}" type="datetimeFigureOut">
               <a:rPr lang="en-US" smtClean="0"/>
+              <a:t>4/24/23</a:t>
             </a:fld>
             <a:endParaRPr lang="en-US"/>
           </a:p>
@@ -568,7 +580,7 @@
         <p:nvSpPr>
           <p:cNvPr id="5" name="Footer Placeholder 4"/>
           <p:cNvSpPr>
-            <a:spLocks noGrp="true"/>
+            <a:spLocks noGrp="1"/>
           </p:cNvSpPr>
           <p:nvPr>
             <p:ph type="ftr" sz="quarter" idx="11"/>
@@ -587,7 +599,7 @@
         <p:nvSpPr>
           <p:cNvPr id="6" name="Slide Number Placeholder 5"/>
           <p:cNvSpPr>
-            <a:spLocks noGrp="true"/>
+            <a:spLocks noGrp="1"/>
           </p:cNvSpPr>
           <p:nvPr>
             <p:ph type="sldNum" sz="quarter" idx="12"/>
@@ -600,6 +612,7 @@
           <a:p>
             <a:fld id="{C5EF2332-01BF-834F-8236-50238282D533}" type="slidenum">
               <a:rPr lang="en-US" smtClean="0"/>
+              <a:t>‹N°›</a:t>
             </a:fld>
             <a:endParaRPr lang="en-US"/>
           </a:p>
@@ -634,7 +647,7 @@
         <p:nvSpPr>
           <p:cNvPr id="2" name="Vertical Title 1"/>
           <p:cNvSpPr>
-            <a:spLocks noGrp="true"/>
+            <a:spLocks noGrp="1"/>
           </p:cNvSpPr>
           <p:nvPr>
             <p:ph type="title" orient="vert"/>
@@ -651,10 +664,9 @@
           <a:lstStyle/>
           <a:p>
             <a:r>
-              <a:rPr lang="en-US" smtClean="0"/>
+              <a:rPr lang="en-US"/>
               <a:t>Click to edit Master title style</a:t>
             </a:r>
-            <a:endParaRPr lang="en-US"/>
           </a:p>
         </p:txBody>
       </p:sp>
@@ -662,7 +674,7 @@
         <p:nvSpPr>
           <p:cNvPr id="3" name="Vertical Text Placeholder 2"/>
           <p:cNvSpPr>
-            <a:spLocks noGrp="true"/>
+            <a:spLocks noGrp="1"/>
           </p:cNvSpPr>
           <p:nvPr>
             <p:ph type="body" orient="vert" idx="1"/>
@@ -680,42 +692,37 @@
           <a:p>
             <a:pPr lvl="0"/>
             <a:r>
-              <a:rPr lang="en-US" smtClean="0"/>
+              <a:rPr lang="en-US"/>
               <a:t>Click to edit Master text styles</a:t>
             </a:r>
-            <a:endParaRPr lang="en-US" smtClean="0"/>
           </a:p>
           <a:p>
             <a:pPr lvl="1"/>
             <a:r>
-              <a:rPr lang="en-US" smtClean="0"/>
+              <a:rPr lang="en-US"/>
               <a:t>Second level</a:t>
             </a:r>
-            <a:endParaRPr lang="en-US" smtClean="0"/>
           </a:p>
           <a:p>
             <a:pPr lvl="2"/>
             <a:r>
-              <a:rPr lang="en-US" smtClean="0"/>
+              <a:rPr lang="en-US"/>
               <a:t>Third level</a:t>
             </a:r>
-            <a:endParaRPr lang="en-US" smtClean="0"/>
           </a:p>
           <a:p>
             <a:pPr lvl="3"/>
             <a:r>
-              <a:rPr lang="en-US" smtClean="0"/>
+              <a:rPr lang="en-US"/>
               <a:t>Fourth level</a:t>
             </a:r>
-            <a:endParaRPr lang="en-US" smtClean="0"/>
           </a:p>
           <a:p>
             <a:pPr lvl="4"/>
             <a:r>
-              <a:rPr lang="en-US" smtClean="0"/>
+              <a:rPr lang="en-US"/>
               <a:t>Fifth level</a:t>
             </a:r>
-            <a:endParaRPr lang="en-US"/>
           </a:p>
         </p:txBody>
       </p:sp>
@@ -723,7 +730,7 @@
         <p:nvSpPr>
           <p:cNvPr id="4" name="Date Placeholder 3"/>
           <p:cNvSpPr>
-            <a:spLocks noGrp="true"/>
+            <a:spLocks noGrp="1"/>
           </p:cNvSpPr>
           <p:nvPr>
             <p:ph type="dt" sz="half" idx="10"/>
@@ -736,6 +743,7 @@
           <a:p>
             <a:fld id="{241EB5C9-1307-BA42-ABA2-0BC069CD8E7F}" type="datetimeFigureOut">
               <a:rPr lang="en-US" smtClean="0"/>
+              <a:t>4/24/23</a:t>
             </a:fld>
             <a:endParaRPr lang="en-US"/>
           </a:p>
@@ -745,7 +753,7 @@
         <p:nvSpPr>
           <p:cNvPr id="5" name="Footer Placeholder 4"/>
           <p:cNvSpPr>
-            <a:spLocks noGrp="true"/>
+            <a:spLocks noGrp="1"/>
           </p:cNvSpPr>
           <p:nvPr>
             <p:ph type="ftr" sz="quarter" idx="11"/>
@@ -764,7 +772,7 @@
         <p:nvSpPr>
           <p:cNvPr id="6" name="Slide Number Placeholder 5"/>
           <p:cNvSpPr>
-            <a:spLocks noGrp="true"/>
+            <a:spLocks noGrp="1"/>
           </p:cNvSpPr>
           <p:nvPr>
             <p:ph type="sldNum" sz="quarter" idx="12"/>
@@ -777,6 +785,7 @@
           <a:p>
             <a:fld id="{C5EF2332-01BF-834F-8236-50238282D533}" type="slidenum">
               <a:rPr lang="en-US" smtClean="0"/>
+              <a:t>‹N°›</a:t>
             </a:fld>
             <a:endParaRPr lang="en-US"/>
           </a:p>
@@ -811,10 +820,10 @@
         <p:nvSpPr>
           <p:cNvPr id="2" name="Title 1"/>
           <p:cNvSpPr>
-            <a:spLocks noGrp="true"/>
-          </p:cNvSpPr>
-          <p:nvPr>
-            <p:ph type="title" hasCustomPrompt="true"/>
+            <a:spLocks noGrp="1"/>
+          </p:cNvSpPr>
+          <p:nvPr>
+            <p:ph type="title" hasCustomPrompt="1"/>
           </p:nvPr>
         </p:nvSpPr>
         <p:spPr/>
@@ -833,14 +842,13 @@
           </a:lstStyle>
           <a:p>
             <a:r>
-              <a:rPr lang="fr-FR" altLang="en-US" smtClean="0"/>
+              <a:rPr lang="fr-FR" altLang="en-US"/>
               <a:t>&gt; </a:t>
             </a:r>
             <a:r>
-              <a:rPr lang="en-US" smtClean="0"/>
+              <a:rPr lang="en-US"/>
               <a:t>Click to edit Master title style</a:t>
             </a:r>
-            <a:endParaRPr lang="en-US"/>
           </a:p>
         </p:txBody>
       </p:sp>
@@ -848,7 +856,7 @@
         <p:nvSpPr>
           <p:cNvPr id="3" name="Content Placeholder 2"/>
           <p:cNvSpPr>
-            <a:spLocks noGrp="true"/>
+            <a:spLocks noGrp="1"/>
           </p:cNvSpPr>
           <p:nvPr>
             <p:ph idx="1"/>
@@ -892,69 +900,64 @@
           <a:p>
             <a:pPr lvl="0"/>
             <a:r>
-              <a:rPr lang="en-US" smtClean="0"/>
+              <a:rPr lang="en-US"/>
               <a:t>Click to edit Master text styles</a:t>
             </a:r>
-            <a:endParaRPr lang="en-US" smtClean="0"/>
           </a:p>
           <a:p>
             <a:pPr lvl="1"/>
             <a:r>
-              <a:rPr lang="en-US" smtClean="0"/>
+              <a:rPr lang="en-US"/>
               <a:t>Second level</a:t>
             </a:r>
-            <a:endParaRPr lang="en-US" smtClean="0"/>
           </a:p>
           <a:p>
             <a:pPr lvl="2"/>
             <a:r>
-              <a:rPr lang="en-US" smtClean="0"/>
+              <a:rPr lang="en-US"/>
               <a:t>Third level</a:t>
             </a:r>
-            <a:endParaRPr lang="en-US" smtClean="0"/>
           </a:p>
           <a:p>
             <a:pPr lvl="3"/>
             <a:r>
-              <a:rPr lang="en-US" smtClean="0"/>
+              <a:rPr lang="en-US"/>
               <a:t>Fourth level</a:t>
             </a:r>
-            <a:endParaRPr lang="en-US" smtClean="0"/>
           </a:p>
           <a:p>
             <a:pPr lvl="4"/>
             <a:r>
-              <a:rPr lang="en-US" smtClean="0"/>
+              <a:rPr lang="en-US"/>
               <a:t>Fifth level</a:t>
             </a:r>
+          </a:p>
+        </p:txBody>
+      </p:sp>
+      <p:sp>
+        <p:nvSpPr>
+          <p:cNvPr id="5" name="Footer Placeholder 4"/>
+          <p:cNvSpPr>
+            <a:spLocks noGrp="1"/>
+          </p:cNvSpPr>
+          <p:nvPr>
+            <p:ph type="ftr" sz="quarter" idx="11"/>
+          </p:nvPr>
+        </p:nvSpPr>
+        <p:spPr/>
+        <p:txBody>
+          <a:bodyPr/>
+          <a:lstStyle/>
+          <a:p>
             <a:endParaRPr lang="en-US"/>
           </a:p>
         </p:txBody>
       </p:sp>
       <p:sp>
         <p:nvSpPr>
-          <p:cNvPr id="5" name="Footer Placeholder 4"/>
-          <p:cNvSpPr>
-            <a:spLocks noGrp="true"/>
-          </p:cNvSpPr>
-          <p:nvPr>
-            <p:ph type="ftr" sz="quarter" idx="11"/>
-          </p:nvPr>
-        </p:nvSpPr>
-        <p:spPr/>
-        <p:txBody>
-          <a:bodyPr/>
-          <a:lstStyle/>
-          <a:p>
-            <a:endParaRPr lang="en-US"/>
-          </a:p>
-        </p:txBody>
-      </p:sp>
-      <p:sp>
-        <p:nvSpPr>
           <p:cNvPr id="6" name="Slide Number Placeholder 5"/>
           <p:cNvSpPr>
-            <a:spLocks noGrp="true"/>
+            <a:spLocks noGrp="1"/>
           </p:cNvSpPr>
           <p:nvPr>
             <p:ph type="sldNum" sz="quarter" idx="12"/>
@@ -967,6 +970,7 @@
           <a:p>
             <a:fld id="{C5EF2332-01BF-834F-8236-50238282D533}" type="slidenum">
               <a:rPr lang="en-US" smtClean="0"/>
+              <a:t>‹N°›</a:t>
             </a:fld>
             <a:endParaRPr lang="en-US"/>
           </a:p>
@@ -976,15 +980,15 @@
         <p:nvPicPr>
           <p:cNvPr id="7" name="Image 13"/>
           <p:cNvPicPr>
-            <a:picLocks noChangeAspect="true"/>
+            <a:picLocks noChangeAspect="1"/>
           </p:cNvPicPr>
-          <p:nvPr userDrawn="true"/>
+          <p:nvPr userDrawn="1"/>
         </p:nvPicPr>
         <p:blipFill>
           <a:blip r:embed="rId2">
             <a:extLst>
               <a:ext uri="{28A0092B-C50C-407E-A947-70E740481C1C}">
-                <a14:useLocalDpi xmlns:a14="http://schemas.microsoft.com/office/drawing/2010/main" val="false"/>
+                <a14:useLocalDpi xmlns:a14="http://schemas.microsoft.com/office/drawing/2010/main" val="0"/>
               </a:ext>
             </a:extLst>
           </a:blip>
@@ -1005,8 +1009,8 @@
       <p:sp>
         <p:nvSpPr>
           <p:cNvPr id="8" name="ZoneTexte 14"/>
-          <p:cNvSpPr txBox="true"/>
-          <p:nvPr userDrawn="true"/>
+          <p:cNvSpPr txBox="1"/>
+          <p:nvPr userDrawn="1"/>
         </p:nvSpPr>
         <p:spPr>
           <a:xfrm>
@@ -1022,6 +1026,7 @@
           <a:bodyPr wrap="square" rtlCol="0">
             <a:spAutoFit/>
           </a:bodyPr>
+          <a:lstStyle/>
           <a:p>
             <a:r>
               <a:rPr lang="it-IT" sz="1000" dirty="0">
@@ -1044,8 +1049,8 @@
       <p:sp>
         <p:nvSpPr>
           <p:cNvPr id="9" name="ZoneTexte 15"/>
-          <p:cNvSpPr txBox="true"/>
-          <p:nvPr userDrawn="true"/>
+          <p:cNvSpPr txBox="1"/>
+          <p:nvPr userDrawn="1"/>
         </p:nvSpPr>
         <p:spPr>
           <a:xfrm>
@@ -1061,6 +1066,7 @@
           <a:bodyPr wrap="square" rtlCol="0">
             <a:spAutoFit/>
           </a:bodyPr>
+          <a:lstStyle/>
           <a:p>
             <a:r>
               <a:rPr lang="fr-FR" sz="1000" dirty="0">
@@ -1071,12 +1077,6 @@
               </a:rPr>
               <a:t>Date / information / nom de l’auteur</a:t>
             </a:r>
-            <a:endParaRPr lang="fr-FR" sz="1000" dirty="0">
-              <a:solidFill>
-                <a:srgbClr val="00A3A6"/>
-              </a:solidFill>
-              <a:latin typeface="Arial" panose="020B0604020202020204" pitchFamily="34" charset="0"/>
-            </a:endParaRPr>
           </a:p>
         </p:txBody>
       </p:sp>
@@ -1107,9 +1107,61 @@
       </p:grpSpPr>
       <p:sp>
         <p:nvSpPr>
+          <p:cNvPr id="8" name="Rectangle 7">
+            <a:extLst>
+              <a:ext uri="{FF2B5EF4-FFF2-40B4-BE49-F238E27FC236}">
+                <a16:creationId xmlns:a16="http://schemas.microsoft.com/office/drawing/2014/main" id="{7FB5D8A7-4F9D-CBAB-4F7D-1013DC6611B8}"/>
+              </a:ext>
+            </a:extLst>
+          </p:cNvPr>
+          <p:cNvSpPr/>
+          <p:nvPr userDrawn="1"/>
+        </p:nvSpPr>
+        <p:spPr>
+          <a:xfrm>
+            <a:off x="0" y="0"/>
+            <a:ext cx="12188825" cy="6858000"/>
+          </a:xfrm>
+          <a:prstGeom prst="rect">
+            <a:avLst/>
+          </a:prstGeom>
+          <a:solidFill>
+            <a:srgbClr val="1EAEB0"/>
+          </a:solidFill>
+          <a:ln>
+            <a:solidFill>
+              <a:srgbClr val="1EAEB0"/>
+            </a:solidFill>
+          </a:ln>
+        </p:spPr>
+        <p:style>
+          <a:lnRef idx="1">
+            <a:schemeClr val="accent1"/>
+          </a:lnRef>
+          <a:fillRef idx="3">
+            <a:schemeClr val="accent1"/>
+          </a:fillRef>
+          <a:effectRef idx="2">
+            <a:schemeClr val="accent1"/>
+          </a:effectRef>
+          <a:fontRef idx="minor">
+            <a:schemeClr val="lt1"/>
+          </a:fontRef>
+        </p:style>
+        <p:txBody>
+          <a:bodyPr rtlCol="0" anchor="ctr"/>
+          <a:lstStyle/>
+          <a:p>
+            <a:pPr algn="ctr"/>
+            <a:endParaRPr lang="fr-FR"/>
+          </a:p>
+        </p:txBody>
+      </p:sp>
+      <p:sp>
+        <p:nvSpPr>
           <p:cNvPr id="2" name="Title 1"/>
           <p:cNvSpPr>
-            <a:spLocks noGrp="true"/>
+            <a:spLocks noGrp="1"/>
           </p:cNvSpPr>
           <p:nvPr>
             <p:ph type="title"/>
@@ -1125,15 +1177,19 @@
           <a:bodyPr anchor="t"/>
           <a:lstStyle>
             <a:lvl1pPr algn="l">
-              <a:defRPr sz="4005" b="1" cap="all"/>
+              <a:defRPr sz="4005" b="1" cap="all">
+                <a:solidFill>
+                  <a:schemeClr val="bg1"/>
+                </a:solidFill>
+                <a:latin typeface="Raleway" panose="020B0503030101060003" pitchFamily="34" charset="77"/>
+              </a:defRPr>
             </a:lvl1pPr>
           </a:lstStyle>
           <a:p>
             <a:r>
-              <a:rPr lang="en-US" smtClean="0"/>
+              <a:rPr lang="en-US" dirty="0"/>
               <a:t>Click to edit Master title style</a:t>
             </a:r>
-            <a:endParaRPr lang="en-US"/>
           </a:p>
         </p:txBody>
       </p:sp>
@@ -1141,7 +1197,7 @@
         <p:nvSpPr>
           <p:cNvPr id="3" name="Text Placeholder 2"/>
           <p:cNvSpPr>
-            <a:spLocks noGrp="true"/>
+            <a:spLocks noGrp="1"/>
           </p:cNvSpPr>
           <p:nvPr>
             <p:ph type="body" idx="1"/>
@@ -1250,10 +1306,9 @@
           <a:p>
             <a:pPr lvl="0"/>
             <a:r>
-              <a:rPr lang="en-US" smtClean="0"/>
+              <a:rPr lang="en-US"/>
               <a:t>Click to edit Master text styles</a:t>
             </a:r>
-            <a:endParaRPr lang="en-US" smtClean="0"/>
           </a:p>
         </p:txBody>
       </p:sp>
@@ -1261,7 +1316,7 @@
         <p:nvSpPr>
           <p:cNvPr id="4" name="Date Placeholder 3"/>
           <p:cNvSpPr>
-            <a:spLocks noGrp="true"/>
+            <a:spLocks noGrp="1"/>
           </p:cNvSpPr>
           <p:nvPr>
             <p:ph type="dt" sz="half" idx="10"/>
@@ -1274,6 +1329,7 @@
           <a:p>
             <a:fld id="{241EB5C9-1307-BA42-ABA2-0BC069CD8E7F}" type="datetimeFigureOut">
               <a:rPr lang="en-US" smtClean="0"/>
+              <a:t>4/24/23</a:t>
             </a:fld>
             <a:endParaRPr lang="en-US"/>
           </a:p>
@@ -1283,7 +1339,7 @@
         <p:nvSpPr>
           <p:cNvPr id="5" name="Footer Placeholder 4"/>
           <p:cNvSpPr>
-            <a:spLocks noGrp="true"/>
+            <a:spLocks noGrp="1"/>
           </p:cNvSpPr>
           <p:nvPr>
             <p:ph type="ftr" sz="quarter" idx="11"/>
@@ -1302,7 +1358,7 @@
         <p:nvSpPr>
           <p:cNvPr id="6" name="Slide Number Placeholder 5"/>
           <p:cNvSpPr>
-            <a:spLocks noGrp="true"/>
+            <a:spLocks noGrp="1"/>
           </p:cNvSpPr>
           <p:nvPr>
             <p:ph type="sldNum" sz="quarter" idx="12"/>
@@ -1315,11 +1371,58 @@
           <a:p>
             <a:fld id="{C5EF2332-01BF-834F-8236-50238282D533}" type="slidenum">
               <a:rPr lang="en-US" smtClean="0"/>
+              <a:t>‹N°›</a:t>
             </a:fld>
             <a:endParaRPr lang="en-US"/>
           </a:p>
         </p:txBody>
       </p:sp>
+      <p:pic>
+        <p:nvPicPr>
+          <p:cNvPr id="7" name="Image 4">
+            <a:extLst>
+              <a:ext uri="{FF2B5EF4-FFF2-40B4-BE49-F238E27FC236}">
+                <a16:creationId xmlns:a16="http://schemas.microsoft.com/office/drawing/2014/main" id="{F3FA81BF-D5E3-2836-0B19-4C2B41F52FF4}"/>
+              </a:ext>
+            </a:extLst>
+          </p:cNvPr>
+          <p:cNvPicPr>
+            <a:picLocks noChangeAspect="1"/>
+          </p:cNvPicPr>
+          <p:nvPr userDrawn="1"/>
+        </p:nvPicPr>
+        <p:blipFill>
+          <a:blip r:embed="rId2">
+            <a:biLevel thresh="50000"/>
+            <a:extLst>
+              <a:ext uri="{BEBA8EAE-BF5A-486C-A8C5-ECC9F3942E4B}">
+                <a14:imgProps xmlns:a14="http://schemas.microsoft.com/office/drawing/2010/main">
+                  <a14:imgLayer r:embed="rId3">
+                    <a14:imgEffect>
+                      <a14:saturation sat="0"/>
+                    </a14:imgEffect>
+                  </a14:imgLayer>
+                </a14:imgProps>
+              </a:ext>
+              <a:ext uri="{28A0092B-C50C-407E-A947-70E740481C1C}">
+                <a14:useLocalDpi xmlns:a14="http://schemas.microsoft.com/office/drawing/2010/main" val="0"/>
+              </a:ext>
+            </a:extLst>
+          </a:blip>
+          <a:stretch>
+            <a:fillRect/>
+          </a:stretch>
+        </p:blipFill>
+        <p:spPr>
+          <a:xfrm>
+            <a:off x="0" y="2394290"/>
+            <a:ext cx="4076700" cy="2790825"/>
+          </a:xfrm>
+          <a:prstGeom prst="rect">
+            <a:avLst/>
+          </a:prstGeom>
+        </p:spPr>
+      </p:pic>
     </p:spTree>
   </p:cSld>
   <p:clrMapOvr>
@@ -1349,7 +1452,7 @@
         <p:nvSpPr>
           <p:cNvPr id="2" name="Title 1"/>
           <p:cNvSpPr>
-            <a:spLocks noGrp="true"/>
+            <a:spLocks noGrp="1"/>
           </p:cNvSpPr>
           <p:nvPr>
             <p:ph type="title"/>
@@ -1361,10 +1464,9 @@
           <a:lstStyle/>
           <a:p>
             <a:r>
-              <a:rPr lang="en-US" smtClean="0"/>
+              <a:rPr lang="en-US"/>
               <a:t>Click to edit Master title style</a:t>
             </a:r>
-            <a:endParaRPr lang="en-US"/>
           </a:p>
         </p:txBody>
       </p:sp>
@@ -1372,7 +1474,7 @@
         <p:nvSpPr>
           <p:cNvPr id="3" name="Content Placeholder 2"/>
           <p:cNvSpPr>
-            <a:spLocks noGrp="true"/>
+            <a:spLocks noGrp="1"/>
           </p:cNvSpPr>
           <p:nvPr>
             <p:ph sz="half" idx="1"/>
@@ -1418,42 +1520,37 @@
           <a:p>
             <a:pPr lvl="0"/>
             <a:r>
-              <a:rPr lang="en-US" smtClean="0"/>
+              <a:rPr lang="en-US"/>
               <a:t>Click to edit Master text styles</a:t>
             </a:r>
-            <a:endParaRPr lang="en-US" smtClean="0"/>
           </a:p>
           <a:p>
             <a:pPr lvl="1"/>
             <a:r>
-              <a:rPr lang="en-US" smtClean="0"/>
+              <a:rPr lang="en-US"/>
               <a:t>Second level</a:t>
             </a:r>
-            <a:endParaRPr lang="en-US" smtClean="0"/>
           </a:p>
           <a:p>
             <a:pPr lvl="2"/>
             <a:r>
-              <a:rPr lang="en-US" smtClean="0"/>
+              <a:rPr lang="en-US"/>
               <a:t>Third level</a:t>
             </a:r>
-            <a:endParaRPr lang="en-US" smtClean="0"/>
           </a:p>
           <a:p>
             <a:pPr lvl="3"/>
             <a:r>
-              <a:rPr lang="en-US" smtClean="0"/>
+              <a:rPr lang="en-US"/>
               <a:t>Fourth level</a:t>
             </a:r>
-            <a:endParaRPr lang="en-US" smtClean="0"/>
           </a:p>
           <a:p>
             <a:pPr lvl="4"/>
             <a:r>
-              <a:rPr lang="en-US" smtClean="0"/>
+              <a:rPr lang="en-US"/>
               <a:t>Fifth level</a:t>
             </a:r>
-            <a:endParaRPr lang="en-US"/>
           </a:p>
         </p:txBody>
       </p:sp>
@@ -1461,7 +1558,7 @@
         <p:nvSpPr>
           <p:cNvPr id="4" name="Content Placeholder 3"/>
           <p:cNvSpPr>
-            <a:spLocks noGrp="true"/>
+            <a:spLocks noGrp="1"/>
           </p:cNvSpPr>
           <p:nvPr>
             <p:ph sz="half" idx="2"/>
@@ -1507,42 +1604,37 @@
           <a:p>
             <a:pPr lvl="0"/>
             <a:r>
-              <a:rPr lang="en-US" smtClean="0"/>
+              <a:rPr lang="en-US"/>
               <a:t>Click to edit Master text styles</a:t>
             </a:r>
-            <a:endParaRPr lang="en-US" smtClean="0"/>
           </a:p>
           <a:p>
             <a:pPr lvl="1"/>
             <a:r>
-              <a:rPr lang="en-US" smtClean="0"/>
+              <a:rPr lang="en-US"/>
               <a:t>Second level</a:t>
             </a:r>
-            <a:endParaRPr lang="en-US" smtClean="0"/>
           </a:p>
           <a:p>
             <a:pPr lvl="2"/>
             <a:r>
-              <a:rPr lang="en-US" smtClean="0"/>
+              <a:rPr lang="en-US"/>
               <a:t>Third level</a:t>
             </a:r>
-            <a:endParaRPr lang="en-US" smtClean="0"/>
           </a:p>
           <a:p>
             <a:pPr lvl="3"/>
             <a:r>
-              <a:rPr lang="en-US" smtClean="0"/>
+              <a:rPr lang="en-US"/>
               <a:t>Fourth level</a:t>
             </a:r>
-            <a:endParaRPr lang="en-US" smtClean="0"/>
           </a:p>
           <a:p>
             <a:pPr lvl="4"/>
             <a:r>
-              <a:rPr lang="en-US" smtClean="0"/>
+              <a:rPr lang="en-US"/>
               <a:t>Fifth level</a:t>
             </a:r>
-            <a:endParaRPr lang="en-US"/>
           </a:p>
         </p:txBody>
       </p:sp>
@@ -1550,7 +1642,7 @@
         <p:nvSpPr>
           <p:cNvPr id="5" name="Date Placeholder 4"/>
           <p:cNvSpPr>
-            <a:spLocks noGrp="true"/>
+            <a:spLocks noGrp="1"/>
           </p:cNvSpPr>
           <p:nvPr>
             <p:ph type="dt" sz="half" idx="10"/>
@@ -1563,6 +1655,7 @@
           <a:p>
             <a:fld id="{241EB5C9-1307-BA42-ABA2-0BC069CD8E7F}" type="datetimeFigureOut">
               <a:rPr lang="en-US" smtClean="0"/>
+              <a:t>4/24/23</a:t>
             </a:fld>
             <a:endParaRPr lang="en-US"/>
           </a:p>
@@ -1572,7 +1665,7 @@
         <p:nvSpPr>
           <p:cNvPr id="6" name="Footer Placeholder 5"/>
           <p:cNvSpPr>
-            <a:spLocks noGrp="true"/>
+            <a:spLocks noGrp="1"/>
           </p:cNvSpPr>
           <p:nvPr>
             <p:ph type="ftr" sz="quarter" idx="11"/>
@@ -1591,7 +1684,7 @@
         <p:nvSpPr>
           <p:cNvPr id="7" name="Slide Number Placeholder 6"/>
           <p:cNvSpPr>
-            <a:spLocks noGrp="true"/>
+            <a:spLocks noGrp="1"/>
           </p:cNvSpPr>
           <p:nvPr>
             <p:ph type="sldNum" sz="quarter" idx="12"/>
@@ -1604,6 +1697,7 @@
           <a:p>
             <a:fld id="{C5EF2332-01BF-834F-8236-50238282D533}" type="slidenum">
               <a:rPr lang="en-US" smtClean="0"/>
+              <a:t>‹N°›</a:t>
             </a:fld>
             <a:endParaRPr lang="en-US"/>
           </a:p>
@@ -1638,7 +1732,7 @@
         <p:nvSpPr>
           <p:cNvPr id="2" name="Title 1"/>
           <p:cNvSpPr>
-            <a:spLocks noGrp="true"/>
+            <a:spLocks noGrp="1"/>
           </p:cNvSpPr>
           <p:nvPr>
             <p:ph type="title"/>
@@ -1654,10 +1748,9 @@
           </a:lstStyle>
           <a:p>
             <a:r>
-              <a:rPr lang="en-US" smtClean="0"/>
+              <a:rPr lang="en-US"/>
               <a:t>Click to edit Master title style</a:t>
             </a:r>
-            <a:endParaRPr lang="en-US"/>
           </a:p>
         </p:txBody>
       </p:sp>
@@ -1665,7 +1758,7 @@
         <p:nvSpPr>
           <p:cNvPr id="3" name="Text Placeholder 2"/>
           <p:cNvSpPr>
-            <a:spLocks noGrp="true"/>
+            <a:spLocks noGrp="1"/>
           </p:cNvSpPr>
           <p:nvPr>
             <p:ph type="body" idx="1"/>
@@ -1720,10 +1813,9 @@
           <a:p>
             <a:pPr lvl="0"/>
             <a:r>
-              <a:rPr lang="en-US" smtClean="0"/>
+              <a:rPr lang="en-US"/>
               <a:t>Click to edit Master text styles</a:t>
             </a:r>
-            <a:endParaRPr lang="en-US" smtClean="0"/>
           </a:p>
         </p:txBody>
       </p:sp>
@@ -1731,7 +1823,7 @@
         <p:nvSpPr>
           <p:cNvPr id="4" name="Content Placeholder 3"/>
           <p:cNvSpPr>
-            <a:spLocks noGrp="true"/>
+            <a:spLocks noGrp="1"/>
           </p:cNvSpPr>
           <p:nvPr>
             <p:ph sz="half" idx="2"/>
@@ -1777,42 +1869,37 @@
           <a:p>
             <a:pPr lvl="0"/>
             <a:r>
-              <a:rPr lang="en-US" smtClean="0"/>
+              <a:rPr lang="en-US"/>
               <a:t>Click to edit Master text styles</a:t>
             </a:r>
-            <a:endParaRPr lang="en-US" smtClean="0"/>
           </a:p>
           <a:p>
             <a:pPr lvl="1"/>
             <a:r>
-              <a:rPr lang="en-US" smtClean="0"/>
+              <a:rPr lang="en-US"/>
               <a:t>Second level</a:t>
             </a:r>
-            <a:endParaRPr lang="en-US" smtClean="0"/>
           </a:p>
           <a:p>
             <a:pPr lvl="2"/>
             <a:r>
-              <a:rPr lang="en-US" smtClean="0"/>
+              <a:rPr lang="en-US"/>
               <a:t>Third level</a:t>
             </a:r>
-            <a:endParaRPr lang="en-US" smtClean="0"/>
           </a:p>
           <a:p>
             <a:pPr lvl="3"/>
             <a:r>
-              <a:rPr lang="en-US" smtClean="0"/>
+              <a:rPr lang="en-US"/>
               <a:t>Fourth level</a:t>
             </a:r>
-            <a:endParaRPr lang="en-US" smtClean="0"/>
           </a:p>
           <a:p>
             <a:pPr lvl="4"/>
             <a:r>
-              <a:rPr lang="en-US" smtClean="0"/>
+              <a:rPr lang="en-US"/>
               <a:t>Fifth level</a:t>
             </a:r>
-            <a:endParaRPr lang="en-US"/>
           </a:p>
         </p:txBody>
       </p:sp>
@@ -1820,7 +1907,7 @@
         <p:nvSpPr>
           <p:cNvPr id="5" name="Text Placeholder 4"/>
           <p:cNvSpPr>
-            <a:spLocks noGrp="true"/>
+            <a:spLocks noGrp="1"/>
           </p:cNvSpPr>
           <p:nvPr>
             <p:ph type="body" sz="quarter" idx="3"/>
@@ -1875,10 +1962,9 @@
           <a:p>
             <a:pPr lvl="0"/>
             <a:r>
-              <a:rPr lang="en-US" smtClean="0"/>
+              <a:rPr lang="en-US"/>
               <a:t>Click to edit Master text styles</a:t>
             </a:r>
-            <a:endParaRPr lang="en-US" smtClean="0"/>
           </a:p>
         </p:txBody>
       </p:sp>
@@ -1886,7 +1972,7 @@
         <p:nvSpPr>
           <p:cNvPr id="6" name="Content Placeholder 5"/>
           <p:cNvSpPr>
-            <a:spLocks noGrp="true"/>
+            <a:spLocks noGrp="1"/>
           </p:cNvSpPr>
           <p:nvPr>
             <p:ph sz="quarter" idx="4"/>
@@ -1932,42 +2018,37 @@
           <a:p>
             <a:pPr lvl="0"/>
             <a:r>
-              <a:rPr lang="en-US" smtClean="0"/>
+              <a:rPr lang="en-US"/>
               <a:t>Click to edit Master text styles</a:t>
             </a:r>
-            <a:endParaRPr lang="en-US" smtClean="0"/>
           </a:p>
           <a:p>
             <a:pPr lvl="1"/>
             <a:r>
-              <a:rPr lang="en-US" smtClean="0"/>
+              <a:rPr lang="en-US"/>
               <a:t>Second level</a:t>
             </a:r>
-            <a:endParaRPr lang="en-US" smtClean="0"/>
           </a:p>
           <a:p>
             <a:pPr lvl="2"/>
             <a:r>
-              <a:rPr lang="en-US" smtClean="0"/>
+              <a:rPr lang="en-US"/>
               <a:t>Third level</a:t>
             </a:r>
-            <a:endParaRPr lang="en-US" smtClean="0"/>
           </a:p>
           <a:p>
             <a:pPr lvl="3"/>
             <a:r>
-              <a:rPr lang="en-US" smtClean="0"/>
+              <a:rPr lang="en-US"/>
               <a:t>Fourth level</a:t>
             </a:r>
-            <a:endParaRPr lang="en-US" smtClean="0"/>
           </a:p>
           <a:p>
             <a:pPr lvl="4"/>
             <a:r>
-              <a:rPr lang="en-US" smtClean="0"/>
+              <a:rPr lang="en-US"/>
               <a:t>Fifth level</a:t>
             </a:r>
-            <a:endParaRPr lang="en-US"/>
           </a:p>
         </p:txBody>
       </p:sp>
@@ -1975,7 +2056,7 @@
         <p:nvSpPr>
           <p:cNvPr id="7" name="Date Placeholder 6"/>
           <p:cNvSpPr>
-            <a:spLocks noGrp="true"/>
+            <a:spLocks noGrp="1"/>
           </p:cNvSpPr>
           <p:nvPr>
             <p:ph type="dt" sz="half" idx="10"/>
@@ -1988,6 +2069,7 @@
           <a:p>
             <a:fld id="{241EB5C9-1307-BA42-ABA2-0BC069CD8E7F}" type="datetimeFigureOut">
               <a:rPr lang="en-US" smtClean="0"/>
+              <a:t>4/24/23</a:t>
             </a:fld>
             <a:endParaRPr lang="en-US"/>
           </a:p>
@@ -1997,7 +2079,7 @@
         <p:nvSpPr>
           <p:cNvPr id="8" name="Footer Placeholder 7"/>
           <p:cNvSpPr>
-            <a:spLocks noGrp="true"/>
+            <a:spLocks noGrp="1"/>
           </p:cNvSpPr>
           <p:nvPr>
             <p:ph type="ftr" sz="quarter" idx="11"/>
@@ -2016,7 +2098,7 @@
         <p:nvSpPr>
           <p:cNvPr id="9" name="Slide Number Placeholder 8"/>
           <p:cNvSpPr>
-            <a:spLocks noGrp="true"/>
+            <a:spLocks noGrp="1"/>
           </p:cNvSpPr>
           <p:nvPr>
             <p:ph type="sldNum" sz="quarter" idx="12"/>
@@ -2029,6 +2111,7 @@
           <a:p>
             <a:fld id="{C5EF2332-01BF-834F-8236-50238282D533}" type="slidenum">
               <a:rPr lang="en-US" smtClean="0"/>
+              <a:t>‹N°›</a:t>
             </a:fld>
             <a:endParaRPr lang="en-US"/>
           </a:p>
@@ -2063,7 +2146,7 @@
         <p:nvSpPr>
           <p:cNvPr id="2" name="Title 1"/>
           <p:cNvSpPr>
-            <a:spLocks noGrp="true"/>
+            <a:spLocks noGrp="1"/>
           </p:cNvSpPr>
           <p:nvPr>
             <p:ph type="title"/>
@@ -2075,10 +2158,9 @@
           <a:lstStyle/>
           <a:p>
             <a:r>
-              <a:rPr lang="en-US" smtClean="0"/>
+              <a:rPr lang="en-US"/>
               <a:t>Click to edit Master title style</a:t>
             </a:r>
-            <a:endParaRPr lang="en-US"/>
           </a:p>
         </p:txBody>
       </p:sp>
@@ -2086,7 +2168,7 @@
         <p:nvSpPr>
           <p:cNvPr id="3" name="Date Placeholder 2"/>
           <p:cNvSpPr>
-            <a:spLocks noGrp="true"/>
+            <a:spLocks noGrp="1"/>
           </p:cNvSpPr>
           <p:nvPr>
             <p:ph type="dt" sz="half" idx="10"/>
@@ -2099,6 +2181,7 @@
           <a:p>
             <a:fld id="{241EB5C9-1307-BA42-ABA2-0BC069CD8E7F}" type="datetimeFigureOut">
               <a:rPr lang="en-US" smtClean="0"/>
+              <a:t>4/24/23</a:t>
             </a:fld>
             <a:endParaRPr lang="en-US"/>
           </a:p>
@@ -2108,7 +2191,7 @@
         <p:nvSpPr>
           <p:cNvPr id="4" name="Footer Placeholder 3"/>
           <p:cNvSpPr>
-            <a:spLocks noGrp="true"/>
+            <a:spLocks noGrp="1"/>
           </p:cNvSpPr>
           <p:nvPr>
             <p:ph type="ftr" sz="quarter" idx="11"/>
@@ -2127,7 +2210,7 @@
         <p:nvSpPr>
           <p:cNvPr id="5" name="Slide Number Placeholder 4"/>
           <p:cNvSpPr>
-            <a:spLocks noGrp="true"/>
+            <a:spLocks noGrp="1"/>
           </p:cNvSpPr>
           <p:nvPr>
             <p:ph type="sldNum" sz="quarter" idx="12"/>
@@ -2140,6 +2223,7 @@
           <a:p>
             <a:fld id="{C5EF2332-01BF-834F-8236-50238282D533}" type="slidenum">
               <a:rPr lang="en-US" smtClean="0"/>
+              <a:t>‹N°›</a:t>
             </a:fld>
             <a:endParaRPr lang="en-US"/>
           </a:p>
@@ -2174,7 +2258,7 @@
         <p:nvSpPr>
           <p:cNvPr id="2" name="Date Placeholder 1"/>
           <p:cNvSpPr>
-            <a:spLocks noGrp="true"/>
+            <a:spLocks noGrp="1"/>
           </p:cNvSpPr>
           <p:nvPr>
             <p:ph type="dt" sz="half" idx="10"/>
@@ -2187,6 +2271,7 @@
           <a:p>
             <a:fld id="{241EB5C9-1307-BA42-ABA2-0BC069CD8E7F}" type="datetimeFigureOut">
               <a:rPr lang="en-US" smtClean="0"/>
+              <a:t>4/24/23</a:t>
             </a:fld>
             <a:endParaRPr lang="en-US"/>
           </a:p>
@@ -2196,7 +2281,7 @@
         <p:nvSpPr>
           <p:cNvPr id="3" name="Footer Placeholder 2"/>
           <p:cNvSpPr>
-            <a:spLocks noGrp="true"/>
+            <a:spLocks noGrp="1"/>
           </p:cNvSpPr>
           <p:nvPr>
             <p:ph type="ftr" sz="quarter" idx="11"/>
@@ -2215,7 +2300,7 @@
         <p:nvSpPr>
           <p:cNvPr id="4" name="Slide Number Placeholder 3"/>
           <p:cNvSpPr>
-            <a:spLocks noGrp="true"/>
+            <a:spLocks noGrp="1"/>
           </p:cNvSpPr>
           <p:nvPr>
             <p:ph type="sldNum" sz="quarter" idx="12"/>
@@ -2228,6 +2313,7 @@
           <a:p>
             <a:fld id="{C5EF2332-01BF-834F-8236-50238282D533}" type="slidenum">
               <a:rPr lang="en-US" smtClean="0"/>
+              <a:t>‹N°›</a:t>
             </a:fld>
             <a:endParaRPr lang="en-US"/>
           </a:p>
@@ -2262,7 +2348,7 @@
         <p:nvSpPr>
           <p:cNvPr id="2" name="Title 1"/>
           <p:cNvSpPr>
-            <a:spLocks noGrp="true"/>
+            <a:spLocks noGrp="1"/>
           </p:cNvSpPr>
           <p:nvPr>
             <p:ph type="title"/>
@@ -2283,10 +2369,9 @@
           </a:lstStyle>
           <a:p>
             <a:r>
-              <a:rPr lang="en-US" smtClean="0"/>
+              <a:rPr lang="en-US"/>
               <a:t>Click to edit Master title style</a:t>
             </a:r>
-            <a:endParaRPr lang="en-US"/>
           </a:p>
         </p:txBody>
       </p:sp>
@@ -2294,7 +2379,7 @@
         <p:nvSpPr>
           <p:cNvPr id="3" name="Content Placeholder 2"/>
           <p:cNvSpPr>
-            <a:spLocks noGrp="true"/>
+            <a:spLocks noGrp="1"/>
           </p:cNvSpPr>
           <p:nvPr>
             <p:ph idx="1"/>
@@ -2340,42 +2425,37 @@
           <a:p>
             <a:pPr lvl="0"/>
             <a:r>
-              <a:rPr lang="en-US" smtClean="0"/>
+              <a:rPr lang="en-US"/>
               <a:t>Click to edit Master text styles</a:t>
             </a:r>
-            <a:endParaRPr lang="en-US" smtClean="0"/>
           </a:p>
           <a:p>
             <a:pPr lvl="1"/>
             <a:r>
-              <a:rPr lang="en-US" smtClean="0"/>
+              <a:rPr lang="en-US"/>
               <a:t>Second level</a:t>
             </a:r>
-            <a:endParaRPr lang="en-US" smtClean="0"/>
           </a:p>
           <a:p>
             <a:pPr lvl="2"/>
             <a:r>
-              <a:rPr lang="en-US" smtClean="0"/>
+              <a:rPr lang="en-US"/>
               <a:t>Third level</a:t>
             </a:r>
-            <a:endParaRPr lang="en-US" smtClean="0"/>
           </a:p>
           <a:p>
             <a:pPr lvl="3"/>
             <a:r>
-              <a:rPr lang="en-US" smtClean="0"/>
+              <a:rPr lang="en-US"/>
               <a:t>Fourth level</a:t>
             </a:r>
-            <a:endParaRPr lang="en-US" smtClean="0"/>
           </a:p>
           <a:p>
             <a:pPr lvl="4"/>
             <a:r>
-              <a:rPr lang="en-US" smtClean="0"/>
+              <a:rPr lang="en-US"/>
               <a:t>Fifth level</a:t>
             </a:r>
-            <a:endParaRPr lang="en-US"/>
           </a:p>
         </p:txBody>
       </p:sp>
@@ -2383,7 +2463,7 @@
         <p:nvSpPr>
           <p:cNvPr id="4" name="Text Placeholder 3"/>
           <p:cNvSpPr>
-            <a:spLocks noGrp="true"/>
+            <a:spLocks noGrp="1"/>
           </p:cNvSpPr>
           <p:nvPr>
             <p:ph type="body" sz="half" idx="2"/>
@@ -2438,10 +2518,9 @@
           <a:p>
             <a:pPr lvl="0"/>
             <a:r>
-              <a:rPr lang="en-US" smtClean="0"/>
+              <a:rPr lang="en-US"/>
               <a:t>Click to edit Master text styles</a:t>
             </a:r>
-            <a:endParaRPr lang="en-US" smtClean="0"/>
           </a:p>
         </p:txBody>
       </p:sp>
@@ -2449,7 +2528,7 @@
         <p:nvSpPr>
           <p:cNvPr id="5" name="Date Placeholder 4"/>
           <p:cNvSpPr>
-            <a:spLocks noGrp="true"/>
+            <a:spLocks noGrp="1"/>
           </p:cNvSpPr>
           <p:nvPr>
             <p:ph type="dt" sz="half" idx="10"/>
@@ -2462,6 +2541,7 @@
           <a:p>
             <a:fld id="{241EB5C9-1307-BA42-ABA2-0BC069CD8E7F}" type="datetimeFigureOut">
               <a:rPr lang="en-US" smtClean="0"/>
+              <a:t>4/24/23</a:t>
             </a:fld>
             <a:endParaRPr lang="en-US"/>
           </a:p>
@@ -2471,7 +2551,7 @@
         <p:nvSpPr>
           <p:cNvPr id="6" name="Footer Placeholder 5"/>
           <p:cNvSpPr>
-            <a:spLocks noGrp="true"/>
+            <a:spLocks noGrp="1"/>
           </p:cNvSpPr>
           <p:nvPr>
             <p:ph type="ftr" sz="quarter" idx="11"/>
@@ -2490,7 +2570,7 @@
         <p:nvSpPr>
           <p:cNvPr id="7" name="Slide Number Placeholder 6"/>
           <p:cNvSpPr>
-            <a:spLocks noGrp="true"/>
+            <a:spLocks noGrp="1"/>
           </p:cNvSpPr>
           <p:nvPr>
             <p:ph type="sldNum" sz="quarter" idx="12"/>
@@ -2503,6 +2583,7 @@
           <a:p>
             <a:fld id="{C5EF2332-01BF-834F-8236-50238282D533}" type="slidenum">
               <a:rPr lang="en-US" smtClean="0"/>
+              <a:t>‹N°›</a:t>
             </a:fld>
             <a:endParaRPr lang="en-US"/>
           </a:p>
@@ -2537,7 +2618,7 @@
         <p:nvSpPr>
           <p:cNvPr id="2" name="Title 1"/>
           <p:cNvSpPr>
-            <a:spLocks noGrp="true"/>
+            <a:spLocks noGrp="1"/>
           </p:cNvSpPr>
           <p:nvPr>
             <p:ph type="title"/>
@@ -2558,10 +2639,9 @@
           </a:lstStyle>
           <a:p>
             <a:r>
-              <a:rPr lang="en-US" smtClean="0"/>
+              <a:rPr lang="en-US"/>
               <a:t>Click to edit Master title style</a:t>
             </a:r>
-            <a:endParaRPr lang="en-US"/>
           </a:p>
         </p:txBody>
       </p:sp>
@@ -2569,7 +2649,7 @@
         <p:nvSpPr>
           <p:cNvPr id="3" name="Picture Placeholder 2"/>
           <p:cNvSpPr>
-            <a:spLocks noGrp="true"/>
+            <a:spLocks noGrp="1"/>
           </p:cNvSpPr>
           <p:nvPr>
             <p:ph type="pic" idx="1"/>
@@ -2630,7 +2710,7 @@
         <p:nvSpPr>
           <p:cNvPr id="4" name="Text Placeholder 3"/>
           <p:cNvSpPr>
-            <a:spLocks noGrp="true"/>
+            <a:spLocks noGrp="1"/>
           </p:cNvSpPr>
           <p:nvPr>
             <p:ph type="body" sz="half" idx="2"/>
@@ -2685,10 +2765,9 @@
           <a:p>
             <a:pPr lvl="0"/>
             <a:r>
-              <a:rPr lang="en-US" smtClean="0"/>
+              <a:rPr lang="en-US"/>
               <a:t>Click to edit Master text styles</a:t>
             </a:r>
-            <a:endParaRPr lang="en-US" smtClean="0"/>
           </a:p>
         </p:txBody>
       </p:sp>
@@ -2696,7 +2775,7 @@
         <p:nvSpPr>
           <p:cNvPr id="5" name="Date Placeholder 4"/>
           <p:cNvSpPr>
-            <a:spLocks noGrp="true"/>
+            <a:spLocks noGrp="1"/>
           </p:cNvSpPr>
           <p:nvPr>
             <p:ph type="dt" sz="half" idx="10"/>
@@ -2709,6 +2788,7 @@
           <a:p>
             <a:fld id="{241EB5C9-1307-BA42-ABA2-0BC069CD8E7F}" type="datetimeFigureOut">
               <a:rPr lang="en-US" smtClean="0"/>
+              <a:t>4/24/23</a:t>
             </a:fld>
             <a:endParaRPr lang="en-US"/>
           </a:p>
@@ -2718,7 +2798,7 @@
         <p:nvSpPr>
           <p:cNvPr id="6" name="Footer Placeholder 5"/>
           <p:cNvSpPr>
-            <a:spLocks noGrp="true"/>
+            <a:spLocks noGrp="1"/>
           </p:cNvSpPr>
           <p:nvPr>
             <p:ph type="ftr" sz="quarter" idx="11"/>
@@ -2737,7 +2817,7 @@
         <p:nvSpPr>
           <p:cNvPr id="7" name="Slide Number Placeholder 6"/>
           <p:cNvSpPr>
-            <a:spLocks noGrp="true"/>
+            <a:spLocks noGrp="1"/>
           </p:cNvSpPr>
           <p:nvPr>
             <p:ph type="sldNum" sz="quarter" idx="12"/>
@@ -2750,6 +2830,7 @@
           <a:p>
             <a:fld id="{C5EF2332-01BF-834F-8236-50238282D533}" type="slidenum">
               <a:rPr lang="en-US" smtClean="0"/>
+              <a:t>‹N°›</a:t>
             </a:fld>
             <a:endParaRPr lang="en-US"/>
           </a:p>
@@ -2789,7 +2870,7 @@
         <p:nvSpPr>
           <p:cNvPr id="2" name="Title Placeholder 1"/>
           <p:cNvSpPr>
-            <a:spLocks noGrp="true"/>
+            <a:spLocks noGrp="1"/>
           </p:cNvSpPr>
           <p:nvPr>
             <p:ph type="title"/>
@@ -2811,10 +2892,9 @@
           <a:lstStyle/>
           <a:p>
             <a:r>
-              <a:rPr lang="en-US" smtClean="0"/>
+              <a:rPr lang="en-US"/>
               <a:t>Click to edit Master title style</a:t>
             </a:r>
-            <a:endParaRPr lang="en-US"/>
           </a:p>
         </p:txBody>
       </p:sp>
@@ -2822,7 +2902,7 @@
         <p:nvSpPr>
           <p:cNvPr id="3" name="Text Placeholder 2"/>
           <p:cNvSpPr>
-            <a:spLocks noGrp="true"/>
+            <a:spLocks noGrp="1"/>
           </p:cNvSpPr>
           <p:nvPr>
             <p:ph type="body" idx="1"/>
@@ -2845,42 +2925,37 @@
           <a:p>
             <a:pPr lvl="0"/>
             <a:r>
-              <a:rPr lang="en-US" smtClean="0"/>
+              <a:rPr lang="en-US"/>
               <a:t>Click to edit Master text styles</a:t>
             </a:r>
-            <a:endParaRPr lang="en-US" smtClean="0"/>
           </a:p>
           <a:p>
             <a:pPr lvl="1"/>
             <a:r>
-              <a:rPr lang="en-US" smtClean="0"/>
+              <a:rPr lang="en-US"/>
               <a:t>Second level</a:t>
             </a:r>
-            <a:endParaRPr lang="en-US" smtClean="0"/>
           </a:p>
           <a:p>
             <a:pPr lvl="2"/>
             <a:r>
-              <a:rPr lang="en-US" smtClean="0"/>
+              <a:rPr lang="en-US"/>
               <a:t>Third level</a:t>
             </a:r>
-            <a:endParaRPr lang="en-US" smtClean="0"/>
           </a:p>
           <a:p>
             <a:pPr lvl="3"/>
             <a:r>
-              <a:rPr lang="en-US" smtClean="0"/>
+              <a:rPr lang="en-US"/>
               <a:t>Fourth level</a:t>
             </a:r>
-            <a:endParaRPr lang="en-US" smtClean="0"/>
           </a:p>
           <a:p>
             <a:pPr lvl="4"/>
             <a:r>
-              <a:rPr lang="en-US" smtClean="0"/>
+              <a:rPr lang="en-US"/>
               <a:t>Fifth level</a:t>
             </a:r>
-            <a:endParaRPr lang="en-US"/>
           </a:p>
         </p:txBody>
       </p:sp>
@@ -2888,7 +2963,7 @@
         <p:nvSpPr>
           <p:cNvPr id="4" name="Date Placeholder 3"/>
           <p:cNvSpPr>
-            <a:spLocks noGrp="true"/>
+            <a:spLocks noGrp="1"/>
           </p:cNvSpPr>
           <p:nvPr>
             <p:ph type="dt" sz="half" idx="2"/>
@@ -2919,6 +2994,7 @@
           <a:p>
             <a:fld id="{241EB5C9-1307-BA42-ABA2-0BC069CD8E7F}" type="datetimeFigureOut">
               <a:rPr lang="en-US" smtClean="0"/>
+              <a:t>4/24/23</a:t>
             </a:fld>
             <a:endParaRPr lang="en-US"/>
           </a:p>
@@ -2928,7 +3004,7 @@
         <p:nvSpPr>
           <p:cNvPr id="5" name="Footer Placeholder 4"/>
           <p:cNvSpPr>
-            <a:spLocks noGrp="true"/>
+            <a:spLocks noGrp="1"/>
           </p:cNvSpPr>
           <p:nvPr>
             <p:ph type="ftr" sz="quarter" idx="3"/>
@@ -2965,7 +3041,7 @@
         <p:nvSpPr>
           <p:cNvPr id="6" name="Slide Number Placeholder 5"/>
           <p:cNvSpPr>
-            <a:spLocks noGrp="true"/>
+            <a:spLocks noGrp="1"/>
           </p:cNvSpPr>
           <p:nvPr>
             <p:ph type="sldNum" sz="quarter" idx="4"/>
@@ -2996,6 +3072,7 @@
           <a:p>
             <a:fld id="{C5EF2332-01BF-834F-8236-50238282D533}" type="slidenum">
               <a:rPr lang="en-US" smtClean="0"/>
+              <a:t>‹N°›</a:t>
             </a:fld>
             <a:endParaRPr lang="en-US"/>
           </a:p>
@@ -3291,7 +3368,7 @@
         <p:nvSpPr>
           <p:cNvPr id="2" name="Title 1"/>
           <p:cNvSpPr>
-            <a:spLocks noGrp="true"/>
+            <a:spLocks noGrp="1"/>
           </p:cNvSpPr>
           <p:nvPr>
             <p:ph type="ctrTitle"/>
@@ -3320,7 +3397,7 @@
         <p:nvSpPr>
           <p:cNvPr id="3" name="Subtitle 2"/>
           <p:cNvSpPr>
-            <a:spLocks noGrp="true"/>
+            <a:spLocks noGrp="1"/>
           </p:cNvSpPr>
           <p:nvPr>
             <p:ph type="subTitle" idx="1"/>
@@ -3343,6 +3420,7 @@
             </a:pPr>
             <a:br/>
             <a:br/>
+            <a:endParaRPr/>
           </a:p>
         </p:txBody>
       </p:sp>
@@ -3375,7 +3453,7 @@
         <p:nvSpPr>
           <p:cNvPr id="2" name="Title 1"/>
           <p:cNvSpPr>
-            <a:spLocks noGrp="true"/>
+            <a:spLocks noGrp="1"/>
           </p:cNvSpPr>
           <p:nvPr>
             <p:ph type="title"/>
@@ -3397,7 +3475,6 @@
               <a:rPr sz="3000"/>
               <a:t>R Markdown</a:t>
             </a:r>
-            <a:endParaRPr sz="3000"/>
           </a:p>
         </p:txBody>
       </p:sp>
@@ -3405,7 +3482,7 @@
         <p:nvSpPr>
           <p:cNvPr id="3" name="Content Placeholder 2"/>
           <p:cNvSpPr>
-            <a:spLocks noGrp="true"/>
+            <a:spLocks noGrp="1"/>
           </p:cNvSpPr>
           <p:nvPr>
             <p:ph idx="1"/>
@@ -3426,7 +3503,7 @@
             </a:r>
             <a:r>
               <a:rPr>
-                <a:hlinkClick r:id="rId1"/>
+                <a:hlinkClick r:id="rId2"/>
               </a:rPr>
               <a:t>http://rmarkdown.rstudio.com</a:t>
             </a:r>
@@ -3478,9 +3555,15 @@
       </p:grpSpPr>
       <p:sp>
         <p:nvSpPr>
-          <p:cNvPr id="2" name="Title 1"/>
-          <p:cNvSpPr>
-            <a:spLocks noGrp="true"/>
+          <p:cNvPr id="2" name="Titre 1">
+            <a:extLst>
+              <a:ext uri="{FF2B5EF4-FFF2-40B4-BE49-F238E27FC236}">
+                <a16:creationId xmlns:a16="http://schemas.microsoft.com/office/drawing/2014/main" id="{DF99DB81-1E23-56BF-4BED-2DD3E0468DAD}"/>
+              </a:ext>
+            </a:extLst>
+          </p:cNvPr>
+          <p:cNvSpPr>
+            <a:spLocks noGrp="1"/>
           </p:cNvSpPr>
           <p:nvPr>
             <p:ph type="title"/>
@@ -3491,62 +3574,41 @@
           <a:bodyPr/>
           <a:lstStyle/>
           <a:p>
-            <a:pPr marL="0" lvl="0" indent="0" algn="l">
-              <a:buNone/>
-            </a:pPr>
-            <a:r>
-              <a:rPr lang="fr-FR" sz="3000"/>
-              <a:t>&gt; </a:t>
-            </a:r>
-            <a:r>
-              <a:rPr sz="3000"/>
-              <a:t>Slide with Bullets</a:t>
-            </a:r>
-            <a:endParaRPr sz="3000"/>
-          </a:p>
-        </p:txBody>
-      </p:sp>
-      <p:sp>
-        <p:nvSpPr>
-          <p:cNvPr id="3" name="Content Placeholder 2"/>
-          <p:cNvSpPr>
-            <a:spLocks noGrp="true"/>
-          </p:cNvSpPr>
-          <p:nvPr>
-            <p:ph idx="1"/>
-          </p:nvPr>
-        </p:nvSpPr>
-        <p:spPr/>
-        <p:txBody>
-          <a:bodyPr/>
-          <a:lstStyle/>
-          <a:p>
-            <a:pPr lvl="1"/>
-            <a:r>
-              <a:rPr sz="1800"/>
-              <a:t>Bullet 1</a:t>
-            </a:r>
-            <a:endParaRPr sz="1800"/>
-          </a:p>
-          <a:p>
-            <a:pPr lvl="1"/>
-            <a:r>
-              <a:rPr sz="1800"/>
-              <a:t>Bullet 2</a:t>
-            </a:r>
-            <a:endParaRPr sz="1800"/>
-          </a:p>
-          <a:p>
-            <a:pPr lvl="1"/>
-            <a:r>
-              <a:rPr sz="1800"/>
-              <a:t>Bullet 3</a:t>
-            </a:r>
-            <a:endParaRPr sz="1800"/>
+            <a:endParaRPr lang="fr-FR"/>
+          </a:p>
+        </p:txBody>
+      </p:sp>
+      <p:sp>
+        <p:nvSpPr>
+          <p:cNvPr id="3" name="Espace réservé du texte 2">
+            <a:extLst>
+              <a:ext uri="{FF2B5EF4-FFF2-40B4-BE49-F238E27FC236}">
+                <a16:creationId xmlns:a16="http://schemas.microsoft.com/office/drawing/2014/main" id="{FBE9441D-12FB-2FFE-3B3E-58F86823EEEE}"/>
+              </a:ext>
+            </a:extLst>
+          </p:cNvPr>
+          <p:cNvSpPr>
+            <a:spLocks noGrp="1"/>
+          </p:cNvSpPr>
+          <p:nvPr>
+            <p:ph type="body" idx="1"/>
+          </p:nvPr>
+        </p:nvSpPr>
+        <p:spPr/>
+        <p:txBody>
+          <a:bodyPr/>
+          <a:lstStyle/>
+          <a:p>
+            <a:endParaRPr lang="fr-FR"/>
           </a:p>
         </p:txBody>
       </p:sp>
     </p:spTree>
+    <p:extLst>
+      <p:ext uri="{BB962C8B-B14F-4D97-AF65-F5344CB8AC3E}">
+        <p14:creationId xmlns:p14="http://schemas.microsoft.com/office/powerpoint/2010/main" val="4283675092"/>
+      </p:ext>
+    </p:extLst>
   </p:cSld>
   <p:clrMapOvr>
     <a:masterClrMapping/>
@@ -3575,7 +3637,7 @@
         <p:nvSpPr>
           <p:cNvPr id="2" name="Title 1"/>
           <p:cNvSpPr>
-            <a:spLocks noGrp="true"/>
+            <a:spLocks noGrp="1"/>
           </p:cNvSpPr>
           <p:nvPr>
             <p:ph type="title"/>
@@ -3586,11 +3648,16 @@
           <a:bodyPr/>
           <a:lstStyle/>
           <a:p>
-            <a:pPr marL="0" lvl="0" indent="0">
+            <a:pPr marL="0" lvl="0" indent="0" algn="l">
               <a:buNone/>
             </a:pPr>
             <a:r>
-              <a:t>Slide with R Output</a:t>
+              <a:rPr lang="fr-FR" sz="3000"/>
+              <a:t>&gt; </a:t>
+            </a:r>
+            <a:r>
+              <a:rPr sz="3000"/>
+              <a:t>Slide with Bullets</a:t>
             </a:r>
           </a:p>
         </p:txBody>
@@ -3599,7 +3666,7 @@
         <p:nvSpPr>
           <p:cNvPr id="3" name="Content Placeholder 2"/>
           <p:cNvSpPr>
-            <a:spLocks noGrp="true"/>
+            <a:spLocks noGrp="1"/>
           </p:cNvSpPr>
           <p:nvPr>
             <p:ph idx="1"/>
@@ -3607,52 +3674,28 @@
         </p:nvSpPr>
         <p:spPr/>
         <p:txBody>
-          <a:bodyPr>
-            <a:normAutofit/>
-          </a:bodyPr>
-          <a:lstStyle/>
-          <a:p>
-            <a:pPr lvl="0" indent="0">
-              <a:buNone/>
-            </a:pPr>
-            <a:r>
-              <a:rPr b="1">
-                <a:solidFill>
-                  <a:srgbClr val="007020"/>
-                </a:solidFill>
-                <a:latin typeface="Courier"/>
-              </a:rPr>
-              <a:t>summary</a:t>
-            </a:r>
-            <a:r>
-              <a:rPr>
-                <a:latin typeface="Courier"/>
-              </a:rPr>
-              <a:t>(cars)</a:t>
-            </a:r>
-            <a:endParaRPr>
-              <a:latin typeface="Courier"/>
-            </a:endParaRPr>
-          </a:p>
-          <a:p>
-            <a:pPr lvl="0" indent="0">
-              <a:buNone/>
-            </a:pPr>
-            <a:r>
-              <a:rPr>
-                <a:latin typeface="Courier"/>
-              </a:rPr>
-              <a:t>##      speed           dist       
-##  Min.   : 4.0   Min.   :  2.00  
-##  1st Qu.:12.0   1st Qu.: 26.00  
-##  Median :15.0   Median : 36.00  
-##  Mean   :15.4   Mean   : 42.98  
-##  3rd Qu.:19.0   3rd Qu.: 56.00  
-##  Max.   :25.0   Max.   :120.00</a:t>
-            </a:r>
-            <a:endParaRPr>
-              <a:latin typeface="Courier"/>
-            </a:endParaRPr>
+          <a:bodyPr/>
+          <a:lstStyle/>
+          <a:p>
+            <a:pPr lvl="1"/>
+            <a:r>
+              <a:rPr sz="1800"/>
+              <a:t>Bullet 1</a:t>
+            </a:r>
+          </a:p>
+          <a:p>
+            <a:pPr lvl="1"/>
+            <a:r>
+              <a:rPr sz="1800"/>
+              <a:t>Bullet 2</a:t>
+            </a:r>
+          </a:p>
+          <a:p>
+            <a:pPr lvl="1"/>
+            <a:r>
+              <a:rPr sz="1800"/>
+              <a:t>Bullet 3</a:t>
+            </a:r>
           </a:p>
         </p:txBody>
       </p:sp>
@@ -3685,7 +3728,111 @@
         <p:nvSpPr>
           <p:cNvPr id="2" name="Title 1"/>
           <p:cNvSpPr>
-            <a:spLocks noGrp="true"/>
+            <a:spLocks noGrp="1"/>
+          </p:cNvSpPr>
+          <p:nvPr>
+            <p:ph type="title"/>
+          </p:nvPr>
+        </p:nvSpPr>
+        <p:spPr/>
+        <p:txBody>
+          <a:bodyPr/>
+          <a:lstStyle/>
+          <a:p>
+            <a:pPr marL="0" lvl="0" indent="0">
+              <a:buNone/>
+            </a:pPr>
+            <a:r>
+              <a:t>Slide with R Output</a:t>
+            </a:r>
+          </a:p>
+        </p:txBody>
+      </p:sp>
+      <p:sp>
+        <p:nvSpPr>
+          <p:cNvPr id="3" name="Content Placeholder 2"/>
+          <p:cNvSpPr>
+            <a:spLocks noGrp="1"/>
+          </p:cNvSpPr>
+          <p:nvPr>
+            <p:ph idx="1"/>
+          </p:nvPr>
+        </p:nvSpPr>
+        <p:spPr/>
+        <p:txBody>
+          <a:bodyPr>
+            <a:normAutofit/>
+          </a:bodyPr>
+          <a:lstStyle/>
+          <a:p>
+            <a:pPr lvl="0" indent="0">
+              <a:buNone/>
+            </a:pPr>
+            <a:r>
+              <a:rPr b="1">
+                <a:solidFill>
+                  <a:srgbClr val="007020"/>
+                </a:solidFill>
+                <a:latin typeface="Courier"/>
+              </a:rPr>
+              <a:t>summary</a:t>
+            </a:r>
+            <a:r>
+              <a:rPr>
+                <a:latin typeface="Courier"/>
+              </a:rPr>
+              <a:t>(cars)</a:t>
+            </a:r>
+          </a:p>
+          <a:p>
+            <a:pPr lvl="0" indent="0">
+              <a:buNone/>
+            </a:pPr>
+            <a:r>
+              <a:rPr>
+                <a:latin typeface="Courier"/>
+              </a:rPr>
+              <a:t>##      speed           dist       
+##  Min.   : 4.0   Min.   :  2.00  
+##  1st Qu.:12.0   1st Qu.: 26.00  
+##  Median :15.0   Median : 36.00  
+##  Mean   :15.4   Mean   : 42.98  
+##  3rd Qu.:19.0   3rd Qu.: 56.00  
+##  Max.   :25.0   Max.   :120.00</a:t>
+            </a:r>
+          </a:p>
+        </p:txBody>
+      </p:sp>
+    </p:spTree>
+  </p:cSld>
+  <p:clrMapOvr>
+    <a:masterClrMapping/>
+  </p:clrMapOvr>
+</p:sld>
+</file>
+
+<file path=ppt/slides/slide6.xml><?xml version="1.0" encoding="utf-8"?>
+<p:sld xmlns:a="http://schemas.openxmlformats.org/drawingml/2006/main" xmlns:r="http://schemas.openxmlformats.org/officeDocument/2006/relationships" xmlns:p="http://schemas.openxmlformats.org/presentationml/2006/main">
+  <p:cSld>
+    <p:spTree>
+      <p:nvGrpSpPr>
+        <p:cNvPr id="1" name=""/>
+        <p:cNvGrpSpPr/>
+        <p:nvPr/>
+      </p:nvGrpSpPr>
+      <p:grpSpPr>
+        <a:xfrm>
+          <a:off x="0" y="0"/>
+          <a:ext cx="0" cy="0"/>
+          <a:chOff x="0" y="0"/>
+          <a:chExt cx="0" cy="0"/>
+        </a:xfrm>
+      </p:grpSpPr>
+      <p:sp>
+        <p:nvSpPr>
+          <p:cNvPr id="2" name="Title 1"/>
+          <p:cNvSpPr>
+            <a:spLocks noGrp="1"/>
           </p:cNvSpPr>
           <p:nvPr>
             <p:ph type="title"/>
@@ -3709,12 +3856,12 @@
         <p:nvPicPr>
           <p:cNvPr id="3" name="Picture 1" descr="test_files/figure-pptx/pressure-1.png"/>
           <p:cNvPicPr>
-            <a:picLocks noGrp="true" noChangeAspect="true"/>
+            <a:picLocks noGrp="1" noChangeAspect="1"/>
           </p:cNvPicPr>
           <p:nvPr/>
         </p:nvPicPr>
         <p:blipFill>
-          <a:blip r:embed="rId1"/>
+          <a:blip r:embed="rId2"/>
           <a:stretch>
             <a:fillRect/>
           </a:stretch>
@@ -3859,7 +4006,7 @@
         <a:solidFill>
           <a:schemeClr val="phClr"/>
         </a:solidFill>
-        <a:gradFill rotWithShape="true">
+        <a:gradFill rotWithShape="1">
           <a:gsLst>
             <a:gs pos="0">
               <a:schemeClr val="phClr">
@@ -3880,9 +4027,9 @@
               </a:schemeClr>
             </a:gs>
           </a:gsLst>
-          <a:lin ang="16200000" scaled="true"/>
+          <a:lin ang="16200000" scaled="1"/>
         </a:gradFill>
-        <a:gradFill rotWithShape="true">
+        <a:gradFill rotWithShape="1">
           <a:gsLst>
             <a:gs pos="0">
               <a:schemeClr val="phClr">
@@ -3899,7 +4046,7 @@
               </a:schemeClr>
             </a:gs>
           </a:gsLst>
-          <a:lin ang="16200000" scaled="false"/>
+          <a:lin ang="16200000" scaled="0"/>
         </a:gradFill>
       </a:fillStyleLst>
       <a:lnStyleLst>
@@ -3969,7 +4116,7 @@
         <a:solidFill>
           <a:schemeClr val="phClr"/>
         </a:solidFill>
-        <a:gradFill rotWithShape="true">
+        <a:gradFill rotWithShape="1">
           <a:gsLst>
             <a:gs pos="0">
               <a:schemeClr val="phClr">
@@ -3995,7 +4142,7 @@
             <a:fillToRect l="50000" t="-80000" r="50000" b="180000"/>
           </a:path>
         </a:gradFill>
-        <a:gradFill rotWithShape="true">
+        <a:gradFill rotWithShape="1">
           <a:gsLst>
             <a:gs pos="0">
               <a:schemeClr val="phClr">
@@ -4057,6 +4204,7 @@
       </a:style>
     </a:lnDef>
   </a:objectDefaults>
+  <a:extraClrSchemeLst/>
   <a:extLst>
     <a:ext uri="{05A4C25C-085E-4340-85A3-A5531E510DB2}">
       <thm15:themeFamily xmlns:thm15="http://schemas.microsoft.com/office/thememl/2012/main" name="Office Theme" id="{62F939B6-93AF-4DB8-9C6B-D6C7DFDC589F}" vid="{4A3C46E8-61CC-4603-A589-7422A47A8E4A}"/>

</xml_diff>